<commit_message>
Add new results and notebook updates
</commit_message>
<xml_diff>
--- a/figures/20200911/newResultsSummary.pptx
+++ b/figures/20200911/newResultsSummary.pptx
@@ -3330,41 +3330,12 @@
           <a:chExt cx="0" cy="0"/>
         </a:xfrm>
       </p:grpSpPr>
-      <p:pic>
-        <p:nvPicPr>
-          <p:cNvPr id="10" name="Picture 9">
-            <a:extLst>
-              <a:ext uri="{FF2B5EF4-FFF2-40B4-BE49-F238E27FC236}">
-                <a16:creationId xmlns:a16="http://schemas.microsoft.com/office/drawing/2014/main" id="{1B124437-9561-3744-860B-6CB04A287DAE}"/>
-              </a:ext>
-            </a:extLst>
-          </p:cNvPr>
-          <p:cNvPicPr>
-            <a:picLocks noChangeAspect="1"/>
-          </p:cNvPicPr>
-          <p:nvPr/>
-        </p:nvPicPr>
-        <p:blipFill rotWithShape="1">
-          <a:blip r:embed="rId2"/>
-          <a:srcRect l="8161" t="5310" r="60062" b="91616"/>
-          <a:stretch/>
-        </p:blipFill>
-        <p:spPr>
-          <a:xfrm>
-            <a:off x="9812049" y="1193379"/>
-            <a:ext cx="2379951" cy="202389"/>
-          </a:xfrm>
-          <a:prstGeom prst="rect">
-            <a:avLst/>
-          </a:prstGeom>
-        </p:spPr>
-      </p:pic>
       <p:grpSp>
         <p:nvGrpSpPr>
-          <p:cNvPr id="20" name="Group 19">
-            <a:extLst>
-              <a:ext uri="{FF2B5EF4-FFF2-40B4-BE49-F238E27FC236}">
-                <a16:creationId xmlns:a16="http://schemas.microsoft.com/office/drawing/2014/main" id="{CB9D95AF-CE67-544B-80DB-2EE47319FE66}"/>
+          <p:cNvPr id="21" name="Group 20">
+            <a:extLst>
+              <a:ext uri="{FF2B5EF4-FFF2-40B4-BE49-F238E27FC236}">
+                <a16:creationId xmlns:a16="http://schemas.microsoft.com/office/drawing/2014/main" id="{3CC7E73F-4742-5946-BEAE-F2DE4DCB481B}"/>
               </a:ext>
             </a:extLst>
           </p:cNvPr>
@@ -3379,268 +3350,318 @@
             <a:chExt cx="13428209" cy="6531729"/>
           </a:xfrm>
         </p:grpSpPr>
-        <p:pic>
-          <p:nvPicPr>
-            <p:cNvPr id="5" name="Picture 4">
+        <p:grpSp>
+          <p:nvGrpSpPr>
+            <p:cNvPr id="20" name="Group 19">
               <a:extLst>
                 <a:ext uri="{FF2B5EF4-FFF2-40B4-BE49-F238E27FC236}">
-                  <a16:creationId xmlns:a16="http://schemas.microsoft.com/office/drawing/2014/main" id="{F28FB612-8778-9143-9507-73DC26E40BCB}"/>
+                  <a16:creationId xmlns:a16="http://schemas.microsoft.com/office/drawing/2014/main" id="{CB9D95AF-CE67-544B-80DB-2EE47319FE66}"/>
                 </a:ext>
               </a:extLst>
             </p:cNvPr>
-            <p:cNvPicPr>
-              <a:picLocks noChangeAspect="1"/>
-            </p:cNvPicPr>
+            <p:cNvGrpSpPr/>
             <p:nvPr/>
-          </p:nvPicPr>
-          <p:blipFill>
-            <a:blip r:embed="rId3"/>
-            <a:stretch>
-              <a:fillRect/>
-            </a:stretch>
-          </p:blipFill>
-          <p:spPr>
+          </p:nvGrpSpPr>
+          <p:grpSpPr>
             <a:xfrm>
-              <a:off x="-60160" y="859621"/>
-              <a:ext cx="6485253" cy="4632324"/>
+              <a:off x="-60160" y="116366"/>
+              <a:ext cx="13428209" cy="6531729"/>
+              <a:chOff x="-60160" y="116366"/>
+              <a:chExt cx="13428209" cy="6531729"/>
             </a:xfrm>
-            <a:prstGeom prst="rect">
-              <a:avLst/>
-            </a:prstGeom>
-          </p:spPr>
-        </p:pic>
+          </p:grpSpPr>
+          <p:pic>
+            <p:nvPicPr>
+              <p:cNvPr id="5" name="Picture 4">
+                <a:extLst>
+                  <a:ext uri="{FF2B5EF4-FFF2-40B4-BE49-F238E27FC236}">
+                    <a16:creationId xmlns:a16="http://schemas.microsoft.com/office/drawing/2014/main" id="{F28FB612-8778-9143-9507-73DC26E40BCB}"/>
+                  </a:ext>
+                </a:extLst>
+              </p:cNvPr>
+              <p:cNvPicPr>
+                <a:picLocks noChangeAspect="1"/>
+              </p:cNvPicPr>
+              <p:nvPr/>
+            </p:nvPicPr>
+            <p:blipFill>
+              <a:blip r:embed="rId2"/>
+              <a:stretch>
+                <a:fillRect/>
+              </a:stretch>
+            </p:blipFill>
+            <p:spPr>
+              <a:xfrm>
+                <a:off x="-60160" y="859621"/>
+                <a:ext cx="6485253" cy="4632324"/>
+              </a:xfrm>
+              <a:prstGeom prst="rect">
+                <a:avLst/>
+              </a:prstGeom>
+            </p:spPr>
+          </p:pic>
+          <p:pic>
+            <p:nvPicPr>
+              <p:cNvPr id="8" name="Picture 7">
+                <a:extLst>
+                  <a:ext uri="{FF2B5EF4-FFF2-40B4-BE49-F238E27FC236}">
+                    <a16:creationId xmlns:a16="http://schemas.microsoft.com/office/drawing/2014/main" id="{5F53E744-3C16-F140-BFEC-90393F70CCCA}"/>
+                  </a:ext>
+                </a:extLst>
+              </p:cNvPr>
+              <p:cNvPicPr>
+                <a:picLocks noChangeAspect="1"/>
+              </p:cNvPicPr>
+              <p:nvPr/>
+            </p:nvPicPr>
+            <p:blipFill rotWithShape="1">
+              <a:blip r:embed="rId2"/>
+              <a:srcRect l="76445" t="27465" b="47577"/>
+              <a:stretch/>
+            </p:blipFill>
+            <p:spPr>
+              <a:xfrm>
+                <a:off x="4007488" y="5491945"/>
+                <a:ext cx="1527587" cy="1156150"/>
+              </a:xfrm>
+              <a:prstGeom prst="rect">
+                <a:avLst/>
+              </a:prstGeom>
+            </p:spPr>
+          </p:pic>
+          <p:pic>
+            <p:nvPicPr>
+              <p:cNvPr id="9" name="Picture 8">
+                <a:extLst>
+                  <a:ext uri="{FF2B5EF4-FFF2-40B4-BE49-F238E27FC236}">
+                    <a16:creationId xmlns:a16="http://schemas.microsoft.com/office/drawing/2014/main" id="{ABEAAAA4-CFF9-A845-9C00-DF89C3B8B793}"/>
+                  </a:ext>
+                </a:extLst>
+              </p:cNvPr>
+              <p:cNvPicPr>
+                <a:picLocks noChangeAspect="1"/>
+              </p:cNvPicPr>
+              <p:nvPr/>
+            </p:nvPicPr>
+            <p:blipFill rotWithShape="1">
+              <a:blip r:embed="rId2"/>
+              <a:srcRect l="76445" t="56135" b="22089"/>
+              <a:stretch/>
+            </p:blipFill>
+            <p:spPr>
+              <a:xfrm>
+                <a:off x="5636167" y="5639349"/>
+                <a:ext cx="1527587" cy="1008746"/>
+              </a:xfrm>
+              <a:prstGeom prst="rect">
+                <a:avLst/>
+              </a:prstGeom>
+            </p:spPr>
+          </p:pic>
+          <p:sp>
+            <p:nvSpPr>
+              <p:cNvPr id="11" name="TextBox 10">
+                <a:extLst>
+                  <a:ext uri="{FF2B5EF4-FFF2-40B4-BE49-F238E27FC236}">
+                    <a16:creationId xmlns:a16="http://schemas.microsoft.com/office/drawing/2014/main" id="{78074967-C056-224D-8EB0-1C79C0EE3080}"/>
+                  </a:ext>
+                </a:extLst>
+              </p:cNvPr>
+              <p:cNvSpPr txBox="1"/>
+              <p:nvPr/>
+            </p:nvSpPr>
+            <p:spPr>
+              <a:xfrm>
+                <a:off x="1021729" y="116366"/>
+                <a:ext cx="3556000" cy="646331"/>
+              </a:xfrm>
+              <a:prstGeom prst="rect">
+                <a:avLst/>
+              </a:prstGeom>
+              <a:noFill/>
+            </p:spPr>
+            <p:txBody>
+              <a:bodyPr wrap="square" rtlCol="0">
+                <a:spAutoFit/>
+              </a:bodyPr>
+              <a:lstStyle/>
+              <a:p>
+                <a:pPr algn="ctr"/>
+                <a:r>
+                  <a:rPr lang="en-US" dirty="0" err="1"/>
+                  <a:t>convertToSubstitution</a:t>
+                </a:r>
+                <a:r>
+                  <a:rPr lang="en-US" dirty="0"/>
+                  <a:t> = FALSE</a:t>
+                </a:r>
+              </a:p>
+              <a:p>
+                <a:pPr algn="ctr"/>
+                <a:r>
+                  <a:rPr lang="en-US" dirty="0"/>
+                  <a:t>Before fixing inversion size issue</a:t>
+                </a:r>
+              </a:p>
+            </p:txBody>
+          </p:sp>
+          <p:sp>
+            <p:nvSpPr>
+              <p:cNvPr id="12" name="TextBox 11">
+                <a:extLst>
+                  <a:ext uri="{FF2B5EF4-FFF2-40B4-BE49-F238E27FC236}">
+                    <a16:creationId xmlns:a16="http://schemas.microsoft.com/office/drawing/2014/main" id="{2AC596F5-0BE0-5246-90B8-52E556E84E8F}"/>
+                  </a:ext>
+                </a:extLst>
+              </p:cNvPr>
+              <p:cNvSpPr txBox="1"/>
+              <p:nvPr/>
+            </p:nvSpPr>
+            <p:spPr>
+              <a:xfrm>
+                <a:off x="9812049" y="187542"/>
+                <a:ext cx="3556000" cy="646331"/>
+              </a:xfrm>
+              <a:prstGeom prst="rect">
+                <a:avLst/>
+              </a:prstGeom>
+              <a:noFill/>
+            </p:spPr>
+            <p:txBody>
+              <a:bodyPr wrap="square" rtlCol="0">
+                <a:spAutoFit/>
+              </a:bodyPr>
+              <a:lstStyle/>
+              <a:p>
+                <a:r>
+                  <a:rPr lang="en-US" dirty="0" err="1"/>
+                  <a:t>convertToSubstitution</a:t>
+                </a:r>
+                <a:r>
+                  <a:rPr lang="en-US" dirty="0"/>
+                  <a:t> = FALSE</a:t>
+                </a:r>
+              </a:p>
+              <a:p>
+                <a:r>
+                  <a:rPr lang="en-US" dirty="0"/>
+                  <a:t>After fixing inversion size issue</a:t>
+                </a:r>
+              </a:p>
+            </p:txBody>
+          </p:sp>
+          <p:sp>
+            <p:nvSpPr>
+              <p:cNvPr id="13" name="TextBox 12">
+                <a:extLst>
+                  <a:ext uri="{FF2B5EF4-FFF2-40B4-BE49-F238E27FC236}">
+                    <a16:creationId xmlns:a16="http://schemas.microsoft.com/office/drawing/2014/main" id="{32B2D589-6BF5-F44F-8DF1-4F31DFA7594F}"/>
+                  </a:ext>
+                </a:extLst>
+              </p:cNvPr>
+              <p:cNvSpPr txBox="1"/>
+              <p:nvPr/>
+            </p:nvSpPr>
+            <p:spPr>
+              <a:xfrm>
+                <a:off x="5836273" y="187542"/>
+                <a:ext cx="3556000" cy="646331"/>
+              </a:xfrm>
+              <a:prstGeom prst="rect">
+                <a:avLst/>
+              </a:prstGeom>
+              <a:noFill/>
+            </p:spPr>
+            <p:txBody>
+              <a:bodyPr wrap="square" rtlCol="0">
+                <a:spAutoFit/>
+              </a:bodyPr>
+              <a:lstStyle/>
+              <a:p>
+                <a:pPr algn="ctr"/>
+                <a:r>
+                  <a:rPr lang="en-US" dirty="0" err="1"/>
+                  <a:t>convertToSubstitution</a:t>
+                </a:r>
+                <a:r>
+                  <a:rPr lang="en-US" dirty="0"/>
+                  <a:t> = TRUE</a:t>
+                </a:r>
+              </a:p>
+              <a:p>
+                <a:pPr algn="ctr"/>
+                <a:r>
+                  <a:rPr lang="en-US" dirty="0"/>
+                  <a:t>After fixing inversion size issue</a:t>
+                </a:r>
+              </a:p>
+            </p:txBody>
+          </p:sp>
+          <p:pic>
+            <p:nvPicPr>
+              <p:cNvPr id="15" name="Picture 14">
+                <a:extLst>
+                  <a:ext uri="{FF2B5EF4-FFF2-40B4-BE49-F238E27FC236}">
+                    <a16:creationId xmlns:a16="http://schemas.microsoft.com/office/drawing/2014/main" id="{D6CDED0B-844D-4445-9F76-2BF22149590B}"/>
+                  </a:ext>
+                </a:extLst>
+              </p:cNvPr>
+              <p:cNvPicPr>
+                <a:picLocks noChangeAspect="1"/>
+              </p:cNvPicPr>
+              <p:nvPr/>
+            </p:nvPicPr>
+            <p:blipFill rotWithShape="1">
+              <a:blip r:embed="rId3"/>
+              <a:srcRect t="4496"/>
+              <a:stretch/>
+            </p:blipFill>
+            <p:spPr>
+              <a:xfrm>
+                <a:off x="4898591" y="1193379"/>
+                <a:ext cx="5691995" cy="4268853"/>
+              </a:xfrm>
+              <a:prstGeom prst="rect">
+                <a:avLst/>
+              </a:prstGeom>
+            </p:spPr>
+          </p:pic>
+          <p:pic>
+            <p:nvPicPr>
+              <p:cNvPr id="19" name="Picture 18">
+                <a:extLst>
+                  <a:ext uri="{FF2B5EF4-FFF2-40B4-BE49-F238E27FC236}">
+                    <a16:creationId xmlns:a16="http://schemas.microsoft.com/office/drawing/2014/main" id="{A81E8B45-05BB-6045-A0F3-5D587591235B}"/>
+                  </a:ext>
+                </a:extLst>
+              </p:cNvPr>
+              <p:cNvPicPr>
+                <a:picLocks noChangeAspect="1"/>
+              </p:cNvPicPr>
+              <p:nvPr/>
+            </p:nvPicPr>
+            <p:blipFill rotWithShape="1">
+              <a:blip r:embed="rId4"/>
+              <a:srcRect t="4853"/>
+              <a:stretch/>
+            </p:blipFill>
+            <p:spPr>
+              <a:xfrm>
+                <a:off x="9331453" y="1412270"/>
+                <a:ext cx="3480607" cy="4049962"/>
+              </a:xfrm>
+              <a:prstGeom prst="rect">
+                <a:avLst/>
+              </a:prstGeom>
+            </p:spPr>
+          </p:pic>
+        </p:grpSp>
         <p:pic>
           <p:nvPicPr>
-            <p:cNvPr id="8" name="Picture 7">
+            <p:cNvPr id="10" name="Picture 9">
               <a:extLst>
                 <a:ext uri="{FF2B5EF4-FFF2-40B4-BE49-F238E27FC236}">
-                  <a16:creationId xmlns:a16="http://schemas.microsoft.com/office/drawing/2014/main" id="{5F53E744-3C16-F140-BFEC-90393F70CCCA}"/>
-                </a:ext>
-              </a:extLst>
-            </p:cNvPr>
-            <p:cNvPicPr>
-              <a:picLocks noChangeAspect="1"/>
-            </p:cNvPicPr>
-            <p:nvPr/>
-          </p:nvPicPr>
-          <p:blipFill rotWithShape="1">
-            <a:blip r:embed="rId3"/>
-            <a:srcRect l="76445" t="27465" b="47577"/>
-            <a:stretch/>
-          </p:blipFill>
-          <p:spPr>
-            <a:xfrm>
-              <a:off x="4007488" y="5491945"/>
-              <a:ext cx="1527587" cy="1156150"/>
-            </a:xfrm>
-            <a:prstGeom prst="rect">
-              <a:avLst/>
-            </a:prstGeom>
-          </p:spPr>
-        </p:pic>
-        <p:pic>
-          <p:nvPicPr>
-            <p:cNvPr id="9" name="Picture 8">
-              <a:extLst>
-                <a:ext uri="{FF2B5EF4-FFF2-40B4-BE49-F238E27FC236}">
-                  <a16:creationId xmlns:a16="http://schemas.microsoft.com/office/drawing/2014/main" id="{ABEAAAA4-CFF9-A845-9C00-DF89C3B8B793}"/>
-                </a:ext>
-              </a:extLst>
-            </p:cNvPr>
-            <p:cNvPicPr>
-              <a:picLocks noChangeAspect="1"/>
-            </p:cNvPicPr>
-            <p:nvPr/>
-          </p:nvPicPr>
-          <p:blipFill rotWithShape="1">
-            <a:blip r:embed="rId3"/>
-            <a:srcRect l="76445" t="56135" b="22089"/>
-            <a:stretch/>
-          </p:blipFill>
-          <p:spPr>
-            <a:xfrm>
-              <a:off x="5636167" y="5639349"/>
-              <a:ext cx="1527587" cy="1008746"/>
-            </a:xfrm>
-            <a:prstGeom prst="rect">
-              <a:avLst/>
-            </a:prstGeom>
-          </p:spPr>
-        </p:pic>
-        <p:sp>
-          <p:nvSpPr>
-            <p:cNvPr id="11" name="TextBox 10">
-              <a:extLst>
-                <a:ext uri="{FF2B5EF4-FFF2-40B4-BE49-F238E27FC236}">
-                  <a16:creationId xmlns:a16="http://schemas.microsoft.com/office/drawing/2014/main" id="{78074967-C056-224D-8EB0-1C79C0EE3080}"/>
-                </a:ext>
-              </a:extLst>
-            </p:cNvPr>
-            <p:cNvSpPr txBox="1"/>
-            <p:nvPr/>
-          </p:nvSpPr>
-          <p:spPr>
-            <a:xfrm>
-              <a:off x="1021729" y="116366"/>
-              <a:ext cx="3556000" cy="646331"/>
-            </a:xfrm>
-            <a:prstGeom prst="rect">
-              <a:avLst/>
-            </a:prstGeom>
-            <a:noFill/>
-          </p:spPr>
-          <p:txBody>
-            <a:bodyPr wrap="square" rtlCol="0">
-              <a:spAutoFit/>
-            </a:bodyPr>
-            <a:lstStyle/>
-            <a:p>
-              <a:pPr algn="ctr"/>
-              <a:r>
-                <a:rPr lang="en-US" dirty="0" err="1"/>
-                <a:t>convertToSubstitution</a:t>
-              </a:r>
-              <a:r>
-                <a:rPr lang="en-US" dirty="0"/>
-                <a:t> = FALSE</a:t>
-              </a:r>
-            </a:p>
-            <a:p>
-              <a:pPr algn="ctr"/>
-              <a:r>
-                <a:rPr lang="en-US" dirty="0"/>
-                <a:t>Before fixing inversion size issue</a:t>
-              </a:r>
-            </a:p>
-          </p:txBody>
-        </p:sp>
-        <p:sp>
-          <p:nvSpPr>
-            <p:cNvPr id="12" name="TextBox 11">
-              <a:extLst>
-                <a:ext uri="{FF2B5EF4-FFF2-40B4-BE49-F238E27FC236}">
-                  <a16:creationId xmlns:a16="http://schemas.microsoft.com/office/drawing/2014/main" id="{2AC596F5-0BE0-5246-90B8-52E556E84E8F}"/>
-                </a:ext>
-              </a:extLst>
-            </p:cNvPr>
-            <p:cNvSpPr txBox="1"/>
-            <p:nvPr/>
-          </p:nvSpPr>
-          <p:spPr>
-            <a:xfrm>
-              <a:off x="9812049" y="187542"/>
-              <a:ext cx="3556000" cy="646331"/>
-            </a:xfrm>
-            <a:prstGeom prst="rect">
-              <a:avLst/>
-            </a:prstGeom>
-            <a:noFill/>
-          </p:spPr>
-          <p:txBody>
-            <a:bodyPr wrap="square" rtlCol="0">
-              <a:spAutoFit/>
-            </a:bodyPr>
-            <a:lstStyle/>
-            <a:p>
-              <a:r>
-                <a:rPr lang="en-US" dirty="0" err="1"/>
-                <a:t>convertToSubstitution</a:t>
-              </a:r>
-              <a:r>
-                <a:rPr lang="en-US" dirty="0"/>
-                <a:t> = FALSE</a:t>
-              </a:r>
-            </a:p>
-            <a:p>
-              <a:r>
-                <a:rPr lang="en-US" dirty="0"/>
-                <a:t>After fixing inversion size issue</a:t>
-              </a:r>
-            </a:p>
-          </p:txBody>
-        </p:sp>
-        <p:sp>
-          <p:nvSpPr>
-            <p:cNvPr id="13" name="TextBox 12">
-              <a:extLst>
-                <a:ext uri="{FF2B5EF4-FFF2-40B4-BE49-F238E27FC236}">
-                  <a16:creationId xmlns:a16="http://schemas.microsoft.com/office/drawing/2014/main" id="{32B2D589-6BF5-F44F-8DF1-4F31DFA7594F}"/>
-                </a:ext>
-              </a:extLst>
-            </p:cNvPr>
-            <p:cNvSpPr txBox="1"/>
-            <p:nvPr/>
-          </p:nvSpPr>
-          <p:spPr>
-            <a:xfrm>
-              <a:off x="5836273" y="187542"/>
-              <a:ext cx="3556000" cy="646331"/>
-            </a:xfrm>
-            <a:prstGeom prst="rect">
-              <a:avLst/>
-            </a:prstGeom>
-            <a:noFill/>
-          </p:spPr>
-          <p:txBody>
-            <a:bodyPr wrap="square" rtlCol="0">
-              <a:spAutoFit/>
-            </a:bodyPr>
-            <a:lstStyle/>
-            <a:p>
-              <a:pPr algn="ctr"/>
-              <a:r>
-                <a:rPr lang="en-US" dirty="0" err="1"/>
-                <a:t>convertToSubstitution</a:t>
-              </a:r>
-              <a:r>
-                <a:rPr lang="en-US" dirty="0"/>
-                <a:t> = TRUE</a:t>
-              </a:r>
-            </a:p>
-            <a:p>
-              <a:pPr algn="ctr"/>
-              <a:r>
-                <a:rPr lang="en-US" dirty="0"/>
-                <a:t>After fixing inversion size issue</a:t>
-              </a:r>
-            </a:p>
-          </p:txBody>
-        </p:sp>
-        <p:pic>
-          <p:nvPicPr>
-            <p:cNvPr id="15" name="Picture 14">
-              <a:extLst>
-                <a:ext uri="{FF2B5EF4-FFF2-40B4-BE49-F238E27FC236}">
-                  <a16:creationId xmlns:a16="http://schemas.microsoft.com/office/drawing/2014/main" id="{D6CDED0B-844D-4445-9F76-2BF22149590B}"/>
-                </a:ext>
-              </a:extLst>
-            </p:cNvPr>
-            <p:cNvPicPr>
-              <a:picLocks noChangeAspect="1"/>
-            </p:cNvPicPr>
-            <p:nvPr/>
-          </p:nvPicPr>
-          <p:blipFill rotWithShape="1">
-            <a:blip r:embed="rId4"/>
-            <a:srcRect t="4496"/>
-            <a:stretch/>
-          </p:blipFill>
-          <p:spPr>
-            <a:xfrm>
-              <a:off x="4898591" y="1193379"/>
-              <a:ext cx="5691995" cy="4268853"/>
-            </a:xfrm>
-            <a:prstGeom prst="rect">
-              <a:avLst/>
-            </a:prstGeom>
-          </p:spPr>
-        </p:pic>
-        <p:pic>
-          <p:nvPicPr>
-            <p:cNvPr id="19" name="Picture 18">
-              <a:extLst>
-                <a:ext uri="{FF2B5EF4-FFF2-40B4-BE49-F238E27FC236}">
-                  <a16:creationId xmlns:a16="http://schemas.microsoft.com/office/drawing/2014/main" id="{A81E8B45-05BB-6045-A0F3-5D587591235B}"/>
+                  <a16:creationId xmlns:a16="http://schemas.microsoft.com/office/drawing/2014/main" id="{1B124437-9561-3744-860B-6CB04A287DAE}"/>
                 </a:ext>
               </a:extLst>
             </p:cNvPr>
@@ -3651,13 +3672,13 @@
           </p:nvPicPr>
           <p:blipFill rotWithShape="1">
             <a:blip r:embed="rId5"/>
-            <a:srcRect t="4853"/>
+            <a:srcRect l="8161" t="5310" r="60062" b="91616"/>
             <a:stretch/>
           </p:blipFill>
           <p:spPr>
             <a:xfrm>
-              <a:off x="9331453" y="1412270"/>
-              <a:ext cx="3480607" cy="4049962"/>
+              <a:off x="9812049" y="1117832"/>
+              <a:ext cx="3000011" cy="255118"/>
             </a:xfrm>
             <a:prstGeom prst="rect">
               <a:avLst/>

</xml_diff>